<commit_message>
updates after 3/3 class
</commit_message>
<xml_diff>
--- a/Lecture2/Brief Intro to GIT.pptx
+++ b/Lecture2/Brief Intro to GIT.pptx
@@ -7,13 +7,13 @@
   <p:sldIdLst>
     <p:sldId id="256" r:id="rId2"/>
     <p:sldId id="257" r:id="rId3"/>
-    <p:sldId id="258" r:id="rId4"/>
-    <p:sldId id="259" r:id="rId5"/>
-    <p:sldId id="260" r:id="rId6"/>
-    <p:sldId id="261" r:id="rId7"/>
-    <p:sldId id="262" r:id="rId8"/>
-    <p:sldId id="263" r:id="rId9"/>
-    <p:sldId id="264" r:id="rId10"/>
+    <p:sldId id="259" r:id="rId4"/>
+    <p:sldId id="260" r:id="rId5"/>
+    <p:sldId id="261" r:id="rId6"/>
+    <p:sldId id="262" r:id="rId7"/>
+    <p:sldId id="263" r:id="rId8"/>
+    <p:sldId id="264" r:id="rId9"/>
+    <p:sldId id="258" r:id="rId10"/>
   </p:sldIdLst>
   <p:sldSz cx="12192000" cy="6858000"/>
   <p:notesSz cx="6858000" cy="9144000"/>
@@ -112,6 +112,11 @@
       </a:defRPr>
     </a:lvl9pPr>
   </p:defaultTextStyle>
+  <p:extLst>
+    <p:ext uri="{EFAFB233-063F-42B5-8137-9DF3F51BA10A}">
+      <p15:sldGuideLst xmlns:p15="http://schemas.microsoft.com/office/powerpoint/2012/main"/>
+    </p:ext>
+  </p:extLst>
 </p:presentation>
 </file>
 
@@ -3579,111 +3584,6 @@
           <p:cNvPr id="2" name="Title 1">
             <a:extLst>
               <a:ext uri="{FF2B5EF4-FFF2-40B4-BE49-F238E27FC236}">
-                <a16:creationId xmlns:a16="http://schemas.microsoft.com/office/drawing/2014/main" id="{7CBB95F2-8AC7-4564-9A78-1D8C4E256504}"/>
-              </a:ext>
-            </a:extLst>
-          </p:cNvPr>
-          <p:cNvSpPr>
-            <a:spLocks noGrp="1"/>
-          </p:cNvSpPr>
-          <p:nvPr>
-            <p:ph type="title"/>
-          </p:nvPr>
-        </p:nvSpPr>
-        <p:spPr/>
-        <p:txBody>
-          <a:bodyPr/>
-          <a:lstStyle/>
-          <a:p>
-            <a:r>
-              <a:rPr lang="en-US" dirty="0"/>
-              <a:t>Local vs Remote</a:t>
-            </a:r>
-          </a:p>
-        </p:txBody>
-      </p:sp>
-      <p:pic>
-        <p:nvPicPr>
-          <p:cNvPr id="1026" name="Picture 2" descr="Image result for git local vs remote repo">
-            <a:extLst>
-              <a:ext uri="{FF2B5EF4-FFF2-40B4-BE49-F238E27FC236}">
-                <a16:creationId xmlns:a16="http://schemas.microsoft.com/office/drawing/2014/main" id="{88108CCC-B5E1-4530-A924-832CE0DD7B8C}"/>
-              </a:ext>
-            </a:extLst>
-          </p:cNvPr>
-          <p:cNvPicPr>
-            <a:picLocks noChangeAspect="1" noChangeArrowheads="1"/>
-          </p:cNvPicPr>
-          <p:nvPr/>
-        </p:nvPicPr>
-        <p:blipFill>
-          <a:blip r:embed="rId2">
-            <a:extLst>
-              <a:ext uri="{28A0092B-C50C-407E-A947-70E740481C1C}">
-                <a14:useLocalDpi xmlns:a14="http://schemas.microsoft.com/office/drawing/2010/main" val="0"/>
-              </a:ext>
-            </a:extLst>
-          </a:blip>
-          <a:srcRect/>
-          <a:stretch>
-            <a:fillRect/>
-          </a:stretch>
-        </p:blipFill>
-        <p:spPr bwMode="auto">
-          <a:xfrm>
-            <a:off x="3574854" y="1800665"/>
-            <a:ext cx="5042292" cy="4136708"/>
-          </a:xfrm>
-          <a:prstGeom prst="rect">
-            <a:avLst/>
-          </a:prstGeom>
-          <a:noFill/>
-          <a:extLst>
-            <a:ext uri="{909E8E84-426E-40DD-AFC4-6F175D3DCCD1}">
-              <a14:hiddenFill xmlns:a14="http://schemas.microsoft.com/office/drawing/2010/main">
-                <a:solidFill>
-                  <a:srgbClr val="FFFFFF"/>
-                </a:solidFill>
-              </a14:hiddenFill>
-            </a:ext>
-          </a:extLst>
-        </p:spPr>
-      </p:pic>
-    </p:spTree>
-    <p:extLst>
-      <p:ext uri="{BB962C8B-B14F-4D97-AF65-F5344CB8AC3E}">
-        <p14:creationId xmlns:p14="http://schemas.microsoft.com/office/powerpoint/2010/main" val="906117296"/>
-      </p:ext>
-    </p:extLst>
-  </p:cSld>
-  <p:clrMapOvr>
-    <a:masterClrMapping/>
-  </p:clrMapOvr>
-</p:sld>
-</file>
-
-<file path=ppt/slides/slide4.xml><?xml version="1.0" encoding="utf-8"?>
-<p:sld xmlns:a="http://schemas.openxmlformats.org/drawingml/2006/main" xmlns:r="http://schemas.openxmlformats.org/officeDocument/2006/relationships" xmlns:p="http://schemas.openxmlformats.org/presentationml/2006/main">
-  <p:cSld>
-    <p:spTree>
-      <p:nvGrpSpPr>
-        <p:cNvPr id="1" name=""/>
-        <p:cNvGrpSpPr/>
-        <p:nvPr/>
-      </p:nvGrpSpPr>
-      <p:grpSpPr>
-        <a:xfrm>
-          <a:off x="0" y="0"/>
-          <a:ext cx="0" cy="0"/>
-          <a:chOff x="0" y="0"/>
-          <a:chExt cx="0" cy="0"/>
-        </a:xfrm>
-      </p:grpSpPr>
-      <p:sp>
-        <p:nvSpPr>
-          <p:cNvPr id="2" name="Title 1">
-            <a:extLst>
-              <a:ext uri="{FF2B5EF4-FFF2-40B4-BE49-F238E27FC236}">
                 <a16:creationId xmlns:a16="http://schemas.microsoft.com/office/drawing/2014/main" id="{98722A1F-E200-4DA6-9420-579D4AA5DD5E}"/>
               </a:ext>
             </a:extLst>
@@ -3774,7 +3674,7 @@
 </p:sld>
 </file>
 
-<file path=ppt/slides/slide5.xml><?xml version="1.0" encoding="utf-8"?>
+<file path=ppt/slides/slide4.xml><?xml version="1.0" encoding="utf-8"?>
 <p:sld xmlns:a="http://schemas.openxmlformats.org/drawingml/2006/main" xmlns:r="http://schemas.openxmlformats.org/officeDocument/2006/relationships" xmlns:p="http://schemas.openxmlformats.org/presentationml/2006/main">
   <p:cSld>
     <p:spTree>
@@ -3914,7 +3814,7 @@
 </p:sld>
 </file>
 
-<file path=ppt/slides/slide6.xml><?xml version="1.0" encoding="utf-8"?>
+<file path=ppt/slides/slide5.xml><?xml version="1.0" encoding="utf-8"?>
 <p:sld xmlns:a="http://schemas.openxmlformats.org/drawingml/2006/main" xmlns:r="http://schemas.openxmlformats.org/officeDocument/2006/relationships" xmlns:p="http://schemas.openxmlformats.org/presentationml/2006/main">
   <p:cSld>
     <p:spTree>
@@ -4054,7 +3954,7 @@
 </p:sld>
 </file>
 
-<file path=ppt/slides/slide7.xml><?xml version="1.0" encoding="utf-8"?>
+<file path=ppt/slides/slide6.xml><?xml version="1.0" encoding="utf-8"?>
 <p:sld xmlns:a="http://schemas.openxmlformats.org/drawingml/2006/main" xmlns:r="http://schemas.openxmlformats.org/officeDocument/2006/relationships" xmlns:p="http://schemas.openxmlformats.org/presentationml/2006/main">
   <p:cSld>
     <p:spTree>
@@ -4181,7 +4081,7 @@
 </p:sld>
 </file>
 
-<file path=ppt/slides/slide8.xml><?xml version="1.0" encoding="utf-8"?>
+<file path=ppt/slides/slide7.xml><?xml version="1.0" encoding="utf-8"?>
 <p:sld xmlns:a="http://schemas.openxmlformats.org/drawingml/2006/main" xmlns:r="http://schemas.openxmlformats.org/officeDocument/2006/relationships" xmlns:p="http://schemas.openxmlformats.org/presentationml/2006/main">
   <p:cSld>
     <p:spTree>
@@ -4311,7 +4211,7 @@
 </p:sld>
 </file>
 
-<file path=ppt/slides/slide9.xml><?xml version="1.0" encoding="utf-8"?>
+<file path=ppt/slides/slide8.xml><?xml version="1.0" encoding="utf-8"?>
 <p:sld xmlns:a="http://schemas.openxmlformats.org/drawingml/2006/main" xmlns:r="http://schemas.openxmlformats.org/officeDocument/2006/relationships" xmlns:p="http://schemas.openxmlformats.org/presentationml/2006/main">
   <p:cSld>
     <p:spTree>
@@ -4478,6 +4378,111 @@
     <p:extLst>
       <p:ext uri="{BB962C8B-B14F-4D97-AF65-F5344CB8AC3E}">
         <p14:creationId xmlns:p14="http://schemas.microsoft.com/office/powerpoint/2010/main" val="486257705"/>
+      </p:ext>
+    </p:extLst>
+  </p:cSld>
+  <p:clrMapOvr>
+    <a:masterClrMapping/>
+  </p:clrMapOvr>
+</p:sld>
+</file>
+
+<file path=ppt/slides/slide9.xml><?xml version="1.0" encoding="utf-8"?>
+<p:sld xmlns:a="http://schemas.openxmlformats.org/drawingml/2006/main" xmlns:r="http://schemas.openxmlformats.org/officeDocument/2006/relationships" xmlns:p="http://schemas.openxmlformats.org/presentationml/2006/main">
+  <p:cSld>
+    <p:spTree>
+      <p:nvGrpSpPr>
+        <p:cNvPr id="1" name=""/>
+        <p:cNvGrpSpPr/>
+        <p:nvPr/>
+      </p:nvGrpSpPr>
+      <p:grpSpPr>
+        <a:xfrm>
+          <a:off x="0" y="0"/>
+          <a:ext cx="0" cy="0"/>
+          <a:chOff x="0" y="0"/>
+          <a:chExt cx="0" cy="0"/>
+        </a:xfrm>
+      </p:grpSpPr>
+      <p:sp>
+        <p:nvSpPr>
+          <p:cNvPr id="2" name="Title 1">
+            <a:extLst>
+              <a:ext uri="{FF2B5EF4-FFF2-40B4-BE49-F238E27FC236}">
+                <a16:creationId xmlns:a16="http://schemas.microsoft.com/office/drawing/2014/main" id="{7CBB95F2-8AC7-4564-9A78-1D8C4E256504}"/>
+              </a:ext>
+            </a:extLst>
+          </p:cNvPr>
+          <p:cNvSpPr>
+            <a:spLocks noGrp="1"/>
+          </p:cNvSpPr>
+          <p:nvPr>
+            <p:ph type="title"/>
+          </p:nvPr>
+        </p:nvSpPr>
+        <p:spPr/>
+        <p:txBody>
+          <a:bodyPr/>
+          <a:lstStyle/>
+          <a:p>
+            <a:r>
+              <a:rPr lang="en-US" dirty="0"/>
+              <a:t>Local vs Remote</a:t>
+            </a:r>
+          </a:p>
+        </p:txBody>
+      </p:sp>
+      <p:pic>
+        <p:nvPicPr>
+          <p:cNvPr id="1026" name="Picture 2" descr="Image result for git local vs remote repo">
+            <a:extLst>
+              <a:ext uri="{FF2B5EF4-FFF2-40B4-BE49-F238E27FC236}">
+                <a16:creationId xmlns:a16="http://schemas.microsoft.com/office/drawing/2014/main" id="{88108CCC-B5E1-4530-A924-832CE0DD7B8C}"/>
+              </a:ext>
+            </a:extLst>
+          </p:cNvPr>
+          <p:cNvPicPr>
+            <a:picLocks noChangeAspect="1" noChangeArrowheads="1"/>
+          </p:cNvPicPr>
+          <p:nvPr/>
+        </p:nvPicPr>
+        <p:blipFill>
+          <a:blip r:embed="rId2">
+            <a:extLst>
+              <a:ext uri="{28A0092B-C50C-407E-A947-70E740481C1C}">
+                <a14:useLocalDpi xmlns:a14="http://schemas.microsoft.com/office/drawing/2010/main" val="0"/>
+              </a:ext>
+            </a:extLst>
+          </a:blip>
+          <a:srcRect/>
+          <a:stretch>
+            <a:fillRect/>
+          </a:stretch>
+        </p:blipFill>
+        <p:spPr bwMode="auto">
+          <a:xfrm>
+            <a:off x="2194560" y="1800665"/>
+            <a:ext cx="7132320" cy="4136708"/>
+          </a:xfrm>
+          <a:prstGeom prst="rect">
+            <a:avLst/>
+          </a:prstGeom>
+          <a:noFill/>
+          <a:extLst>
+            <a:ext uri="{909E8E84-426E-40DD-AFC4-6F175D3DCCD1}">
+              <a14:hiddenFill xmlns:a14="http://schemas.microsoft.com/office/drawing/2010/main">
+                <a:solidFill>
+                  <a:srgbClr val="FFFFFF"/>
+                </a:solidFill>
+              </a14:hiddenFill>
+            </a:ext>
+          </a:extLst>
+        </p:spPr>
+      </p:pic>
+    </p:spTree>
+    <p:extLst>
+      <p:ext uri="{BB962C8B-B14F-4D97-AF65-F5344CB8AC3E}">
+        <p14:creationId xmlns:p14="http://schemas.microsoft.com/office/powerpoint/2010/main" val="906117296"/>
       </p:ext>
     </p:extLst>
   </p:cSld>

</xml_diff>